<commit_message>
slides and figure update.
</commit_message>
<xml_diff>
--- a/Summary/20211215_microbiome_demographic_slides.pptx
+++ b/Summary/20211215_microbiome_demographic_slides.pptx
@@ -152,7 +152,7 @@
 <p1510:revInfo xmlns:a="http://schemas.openxmlformats.org/drawingml/2006/main" xmlns:r="http://schemas.openxmlformats.org/officeDocument/2006/relationships" xmlns:p1510="http://schemas.microsoft.com/office/powerpoint/2015/10/main">
   <p1510:revLst>
     <p1510:client id="{7D05F4F8-9059-49CC-84BE-4CFCE7F8E2DE}" v="663" dt="2021-12-15T22:36:03.703"/>
-    <p1510:client id="{B22062E3-1A32-4548-8B8F-B37E6BBBD718}" v="1193" dt="2021-12-16T01:27:38.880"/>
+    <p1510:client id="{B22062E3-1A32-4548-8B8F-B37E6BBBD718}" v="1202" dt="2021-12-16T01:41:18.793"/>
   </p1510:revLst>
 </p1510:revInfo>
 </file>
@@ -162,7 +162,7 @@
   <pc:docChgLst>
     <pc:chgData name="Jonathan Mah" userId="5261b2f2f3e51194" providerId="LiveId" clId="{B22062E3-1A32-4548-8B8F-B37E6BBBD718}"/>
     <pc:docChg chg="undo custSel addSld delSld modSld modSection">
-      <pc:chgData name="Jonathan Mah" userId="5261b2f2f3e51194" providerId="LiveId" clId="{B22062E3-1A32-4548-8B8F-B37E6BBBD718}" dt="2021-12-16T01:27:38.880" v="1312" actId="5793"/>
+      <pc:chgData name="Jonathan Mah" userId="5261b2f2f3e51194" providerId="LiveId" clId="{B22062E3-1A32-4548-8B8F-B37E6BBBD718}" dt="2021-12-16T01:41:18.793" v="1321" actId="27614"/>
       <pc:docMkLst>
         <pc:docMk/>
       </pc:docMkLst>
@@ -365,7 +365,7 @@
         </pc:picChg>
       </pc:sldChg>
       <pc:sldChg chg="addSp delSp modSp new mod">
-        <pc:chgData name="Jonathan Mah" userId="5261b2f2f3e51194" providerId="LiveId" clId="{B22062E3-1A32-4548-8B8F-B37E6BBBD718}" dt="2021-12-16T01:09:50.489" v="241"/>
+        <pc:chgData name="Jonathan Mah" userId="5261b2f2f3e51194" providerId="LiveId" clId="{B22062E3-1A32-4548-8B8F-B37E6BBBD718}" dt="2021-12-16T01:41:02.084" v="1315" actId="27614"/>
         <pc:sldMkLst>
           <pc:docMk/>
           <pc:sldMk cId="1711273981" sldId="354"/>
@@ -386,6 +386,14 @@
             <ac:spMk id="3" creationId="{90DD5F77-23A4-4906-8218-252C1BE36107}"/>
           </ac:spMkLst>
         </pc:spChg>
+        <pc:spChg chg="add del mod">
+          <ac:chgData name="Jonathan Mah" userId="5261b2f2f3e51194" providerId="LiveId" clId="{B22062E3-1A32-4548-8B8F-B37E6BBBD718}" dt="2021-12-16T01:41:00.934" v="1314" actId="931"/>
+          <ac:spMkLst>
+            <pc:docMk/>
+            <pc:sldMk cId="1711273981" sldId="354"/>
+            <ac:spMk id="4" creationId="{C5DB0C79-A76B-4607-80E4-7B34C57C99FB}"/>
+          </ac:spMkLst>
+        </pc:spChg>
         <pc:grpChg chg="mod">
           <ac:chgData name="Jonathan Mah" userId="5261b2f2f3e51194" providerId="LiveId" clId="{B22062E3-1A32-4548-8B8F-B37E6BBBD718}" dt="2021-12-16T01:09:50.489" v="241"/>
           <ac:grpSpMkLst>
@@ -402,12 +410,20 @@
             <ac:grpSpMk id="13" creationId="{670F10C8-68FA-4A1A-8E32-E26B09D76BAF}"/>
           </ac:grpSpMkLst>
         </pc:grpChg>
-        <pc:picChg chg="add mod">
-          <ac:chgData name="Jonathan Mah" userId="5261b2f2f3e51194" providerId="LiveId" clId="{B22062E3-1A32-4548-8B8F-B37E6BBBD718}" dt="2021-12-15T21:51:10.601" v="86" actId="962"/>
+        <pc:picChg chg="add del mod">
+          <ac:chgData name="Jonathan Mah" userId="5261b2f2f3e51194" providerId="LiveId" clId="{B22062E3-1A32-4548-8B8F-B37E6BBBD718}" dt="2021-12-16T01:40:49.810" v="1313" actId="478"/>
           <ac:picMkLst>
             <pc:docMk/>
             <pc:sldMk cId="1711273981" sldId="354"/>
             <ac:picMk id="5" creationId="{F89D9D6A-C63C-4731-A009-82201244BFB4}"/>
+          </ac:picMkLst>
+        </pc:picChg>
+        <pc:picChg chg="add mod">
+          <ac:chgData name="Jonathan Mah" userId="5261b2f2f3e51194" providerId="LiveId" clId="{B22062E3-1A32-4548-8B8F-B37E6BBBD718}" dt="2021-12-16T01:41:02.084" v="1315" actId="27614"/>
+          <ac:picMkLst>
+            <pc:docMk/>
+            <pc:sldMk cId="1711273981" sldId="354"/>
+            <ac:picMk id="15" creationId="{0C6F450E-8A9F-4E32-8772-4F788A29C59C}"/>
           </ac:picMkLst>
         </pc:picChg>
         <pc:inkChg chg="add mod">
@@ -460,7 +476,7 @@
         </pc:inkChg>
       </pc:sldChg>
       <pc:sldChg chg="addSp delSp modSp new mod">
-        <pc:chgData name="Jonathan Mah" userId="5261b2f2f3e51194" providerId="LiveId" clId="{B22062E3-1A32-4548-8B8F-B37E6BBBD718}" dt="2021-12-16T01:21:42.743" v="365" actId="9405"/>
+        <pc:chgData name="Jonathan Mah" userId="5261b2f2f3e51194" providerId="LiveId" clId="{B22062E3-1A32-4548-8B8F-B37E6BBBD718}" dt="2021-12-16T01:41:09.940" v="1318" actId="27614"/>
         <pc:sldMkLst>
           <pc:docMk/>
           <pc:sldMk cId="1188700012" sldId="355"/>
@@ -481,12 +497,28 @@
             <ac:spMk id="3" creationId="{C6F3EB52-F8C4-403F-8B5D-4ED12D9AD85E}"/>
           </ac:spMkLst>
         </pc:spChg>
-        <pc:picChg chg="add mod">
-          <ac:chgData name="Jonathan Mah" userId="5261b2f2f3e51194" providerId="LiveId" clId="{B22062E3-1A32-4548-8B8F-B37E6BBBD718}" dt="2021-12-15T21:51:21.125" v="88" actId="27614"/>
+        <pc:spChg chg="add del mod">
+          <ac:chgData name="Jonathan Mah" userId="5261b2f2f3e51194" providerId="LiveId" clId="{B22062E3-1A32-4548-8B8F-B37E6BBBD718}" dt="2021-12-16T01:41:09.052" v="1317" actId="931"/>
+          <ac:spMkLst>
+            <pc:docMk/>
+            <pc:sldMk cId="1188700012" sldId="355"/>
+            <ac:spMk id="4" creationId="{8759AA31-C8B5-4C91-A920-16CD189A9F56}"/>
+          </ac:spMkLst>
+        </pc:spChg>
+        <pc:picChg chg="add del mod">
+          <ac:chgData name="Jonathan Mah" userId="5261b2f2f3e51194" providerId="LiveId" clId="{B22062E3-1A32-4548-8B8F-B37E6BBBD718}" dt="2021-12-16T01:41:03.530" v="1316" actId="478"/>
           <ac:picMkLst>
             <pc:docMk/>
             <pc:sldMk cId="1188700012" sldId="355"/>
             <ac:picMk id="5" creationId="{CD1AF8F8-24AF-4D00-AFBF-075ED703D208}"/>
+          </ac:picMkLst>
+        </pc:picChg>
+        <pc:picChg chg="add mod">
+          <ac:chgData name="Jonathan Mah" userId="5261b2f2f3e51194" providerId="LiveId" clId="{B22062E3-1A32-4548-8B8F-B37E6BBBD718}" dt="2021-12-16T01:41:09.940" v="1318" actId="27614"/>
+          <ac:picMkLst>
+            <pc:docMk/>
+            <pc:sldMk cId="1188700012" sldId="355"/>
+            <ac:picMk id="9" creationId="{60F61673-CBBD-40F6-87B2-8E538F958299}"/>
           </ac:picMkLst>
         </pc:picChg>
         <pc:inkChg chg="add">
@@ -602,7 +634,7 @@
         </pc:inkChg>
       </pc:sldChg>
       <pc:sldChg chg="addSp delSp modSp new mod">
-        <pc:chgData name="Jonathan Mah" userId="5261b2f2f3e51194" providerId="LiveId" clId="{B22062E3-1A32-4548-8B8F-B37E6BBBD718}" dt="2021-12-15T21:56:53.917" v="122" actId="27614"/>
+        <pc:chgData name="Jonathan Mah" userId="5261b2f2f3e51194" providerId="LiveId" clId="{B22062E3-1A32-4548-8B8F-B37E6BBBD718}" dt="2021-12-16T01:41:18.793" v="1321" actId="27614"/>
         <pc:sldMkLst>
           <pc:docMk/>
           <pc:sldMk cId="4150376840" sldId="357"/>
@@ -624,6 +656,14 @@
           </ac:spMkLst>
         </pc:spChg>
         <pc:spChg chg="add del mod">
+          <ac:chgData name="Jonathan Mah" userId="5261b2f2f3e51194" providerId="LiveId" clId="{B22062E3-1A32-4548-8B8F-B37E6BBBD718}" dt="2021-12-16T01:41:18.188" v="1320" actId="931"/>
+          <ac:spMkLst>
+            <pc:docMk/>
+            <pc:sldMk cId="4150376840" sldId="357"/>
+            <ac:spMk id="4" creationId="{B36792B8-EB44-454D-B3BF-68C918237C63}"/>
+          </ac:spMkLst>
+        </pc:spChg>
+        <pc:spChg chg="add del mod">
           <ac:chgData name="Jonathan Mah" userId="5261b2f2f3e51194" providerId="LiveId" clId="{B22062E3-1A32-4548-8B8F-B37E6BBBD718}" dt="2021-12-15T21:56:52.466" v="121" actId="931"/>
           <ac:spMkLst>
             <pc:docMk/>
@@ -640,7 +680,15 @@
           </ac:picMkLst>
         </pc:picChg>
         <pc:picChg chg="add mod">
-          <ac:chgData name="Jonathan Mah" userId="5261b2f2f3e51194" providerId="LiveId" clId="{B22062E3-1A32-4548-8B8F-B37E6BBBD718}" dt="2021-12-15T21:56:53.917" v="122" actId="27614"/>
+          <ac:chgData name="Jonathan Mah" userId="5261b2f2f3e51194" providerId="LiveId" clId="{B22062E3-1A32-4548-8B8F-B37E6BBBD718}" dt="2021-12-16T01:41:18.793" v="1321" actId="27614"/>
+          <ac:picMkLst>
+            <pc:docMk/>
+            <pc:sldMk cId="4150376840" sldId="357"/>
+            <ac:picMk id="6" creationId="{5AC10329-71E1-4B6E-9522-C245E866C60E}"/>
+          </ac:picMkLst>
+        </pc:picChg>
+        <pc:picChg chg="add del mod">
+          <ac:chgData name="Jonathan Mah" userId="5261b2f2f3e51194" providerId="LiveId" clId="{B22062E3-1A32-4548-8B8F-B37E6BBBD718}" dt="2021-12-16T01:41:12.436" v="1319" actId="478"/>
           <ac:picMkLst>
             <pc:docMk/>
             <pc:sldMk cId="4150376840" sldId="357"/>
@@ -6876,41 +6924,6 @@
           </a:p>
         </p:txBody>
       </p:sp>
-      <p:pic>
-        <p:nvPicPr>
-          <p:cNvPr id="5" name="Content Placeholder 4" descr="A picture containing timeline&#10;&#10;Description automatically generated">
-            <a:extLst>
-              <a:ext uri="{FF2B5EF4-FFF2-40B4-BE49-F238E27FC236}">
-                <a16:creationId xmlns:a16="http://schemas.microsoft.com/office/drawing/2014/main" id="{F89D9D6A-C63C-4731-A009-82201244BFB4}"/>
-              </a:ext>
-            </a:extLst>
-          </p:cNvPr>
-          <p:cNvPicPr>
-            <a:picLocks noGrp="1" noChangeAspect="1"/>
-          </p:cNvPicPr>
-          <p:nvPr>
-            <p:ph idx="1"/>
-          </p:nvPr>
-        </p:nvPicPr>
-        <p:blipFill>
-          <a:blip r:embed="rId2">
-            <a:extLst>
-              <a:ext uri="{28A0092B-C50C-407E-A947-70E740481C1C}">
-                <a14:useLocalDpi xmlns:a14="http://schemas.microsoft.com/office/drawing/2010/main" val="0"/>
-              </a:ext>
-            </a:extLst>
-          </a:blip>
-          <a:stretch>
-            <a:fillRect/>
-          </a:stretch>
-        </p:blipFill>
-        <p:spPr>
-          <a:xfrm>
-            <a:off x="3195108" y="1825625"/>
-            <a:ext cx="5801783" cy="4351338"/>
-          </a:xfrm>
-        </p:spPr>
-      </p:pic>
       <p:grpSp>
         <p:nvGrpSpPr>
           <p:cNvPr id="13" name="Group 12">
@@ -6933,7 +6946,7 @@
         </p:grpSpPr>
         <mc:AlternateContent xmlns:mc="http://schemas.openxmlformats.org/markup-compatibility/2006">
           <mc:Choice xmlns:p14="http://schemas.microsoft.com/office/powerpoint/2010/main" Requires="p14">
-            <p:contentPart p14:bwMode="auto" r:id="rId3">
+            <p:contentPart p14:bwMode="auto" r:id="rId2">
               <p14:nvContentPartPr>
                 <p14:cNvPr id="6" name="Ink 5">
                   <a:extLst>
@@ -6965,7 +6978,7 @@
                 <p:nvPr/>
               </p:nvPicPr>
               <p:blipFill>
-                <a:blip r:embed="rId4"/>
+                <a:blip r:embed="rId3"/>
                 <a:stretch>
                   <a:fillRect/>
                 </a:stretch>
@@ -6984,7 +6997,7 @@
         </mc:AlternateContent>
         <mc:AlternateContent xmlns:mc="http://schemas.openxmlformats.org/markup-compatibility/2006">
           <mc:Choice xmlns:p14="http://schemas.microsoft.com/office/powerpoint/2010/main" Requires="p14">
-            <p:contentPart p14:bwMode="auto" r:id="rId5">
+            <p:contentPart p14:bwMode="auto" r:id="rId4">
               <p14:nvContentPartPr>
                 <p14:cNvPr id="7" name="Ink 6">
                   <a:extLst>
@@ -7016,7 +7029,7 @@
                 <p:nvPr/>
               </p:nvPicPr>
               <p:blipFill>
-                <a:blip r:embed="rId6"/>
+                <a:blip r:embed="rId5"/>
                 <a:stretch>
                   <a:fillRect/>
                 </a:stretch>
@@ -7035,7 +7048,7 @@
         </mc:AlternateContent>
         <mc:AlternateContent xmlns:mc="http://schemas.openxmlformats.org/markup-compatibility/2006">
           <mc:Choice xmlns:p14="http://schemas.microsoft.com/office/powerpoint/2010/main" Requires="p14">
-            <p:contentPart p14:bwMode="auto" r:id="rId7">
+            <p:contentPart p14:bwMode="auto" r:id="rId6">
               <p14:nvContentPartPr>
                 <p14:cNvPr id="8" name="Ink 7">
                   <a:extLst>
@@ -7067,7 +7080,7 @@
                 <p:nvPr/>
               </p:nvPicPr>
               <p:blipFill>
-                <a:blip r:embed="rId8"/>
+                <a:blip r:embed="rId7"/>
                 <a:stretch>
                   <a:fillRect/>
                 </a:stretch>
@@ -7107,7 +7120,7 @@
         </p:grpSpPr>
         <mc:AlternateContent xmlns:mc="http://schemas.openxmlformats.org/markup-compatibility/2006">
           <mc:Choice xmlns:p14="http://schemas.microsoft.com/office/powerpoint/2010/main" Requires="p14">
-            <p:contentPart p14:bwMode="auto" r:id="rId9">
+            <p:contentPart p14:bwMode="auto" r:id="rId8">
               <p14:nvContentPartPr>
                 <p14:cNvPr id="9" name="Ink 8">
                   <a:extLst>
@@ -7139,7 +7152,7 @@
                 <p:nvPr/>
               </p:nvPicPr>
               <p:blipFill>
-                <a:blip r:embed="rId10"/>
+                <a:blip r:embed="rId9"/>
                 <a:stretch>
                   <a:fillRect/>
                 </a:stretch>
@@ -7158,7 +7171,7 @@
         </mc:AlternateContent>
         <mc:AlternateContent xmlns:mc="http://schemas.openxmlformats.org/markup-compatibility/2006">
           <mc:Choice xmlns:p14="http://schemas.microsoft.com/office/powerpoint/2010/main" Requires="p14">
-            <p:contentPart p14:bwMode="auto" r:id="rId11">
+            <p:contentPart p14:bwMode="auto" r:id="rId10">
               <p14:nvContentPartPr>
                 <p14:cNvPr id="10" name="Ink 9">
                   <a:extLst>
@@ -7190,7 +7203,7 @@
                 <p:nvPr/>
               </p:nvPicPr>
               <p:blipFill>
-                <a:blip r:embed="rId12"/>
+                <a:blip r:embed="rId11"/>
                 <a:stretch>
                   <a:fillRect/>
                 </a:stretch>
@@ -7209,7 +7222,7 @@
         </mc:AlternateContent>
         <mc:AlternateContent xmlns:mc="http://schemas.openxmlformats.org/markup-compatibility/2006">
           <mc:Choice xmlns:p14="http://schemas.microsoft.com/office/powerpoint/2010/main" Requires="p14">
-            <p:contentPart p14:bwMode="auto" r:id="rId13">
+            <p:contentPart p14:bwMode="auto" r:id="rId12">
               <p14:nvContentPartPr>
                 <p14:cNvPr id="11" name="Ink 10">
                   <a:extLst>
@@ -7241,7 +7254,7 @@
                 <p:nvPr/>
               </p:nvPicPr>
               <p:blipFill>
-                <a:blip r:embed="rId14"/>
+                <a:blip r:embed="rId13"/>
                 <a:stretch>
                   <a:fillRect/>
                 </a:stretch>
@@ -7259,6 +7272,41 @@
           </mc:Fallback>
         </mc:AlternateContent>
       </p:grpSp>
+      <p:pic>
+        <p:nvPicPr>
+          <p:cNvPr id="15" name="Content Placeholder 14" descr="Timeline&#10;&#10;Description automatically generated">
+            <a:extLst>
+              <a:ext uri="{FF2B5EF4-FFF2-40B4-BE49-F238E27FC236}">
+                <a16:creationId xmlns:a16="http://schemas.microsoft.com/office/drawing/2014/main" id="{0C6F450E-8A9F-4E32-8772-4F788A29C59C}"/>
+              </a:ext>
+            </a:extLst>
+          </p:cNvPr>
+          <p:cNvPicPr>
+            <a:picLocks noGrp="1" noChangeAspect="1"/>
+          </p:cNvPicPr>
+          <p:nvPr>
+            <p:ph idx="1"/>
+          </p:nvPr>
+        </p:nvPicPr>
+        <p:blipFill>
+          <a:blip r:embed="rId14">
+            <a:extLst>
+              <a:ext uri="{28A0092B-C50C-407E-A947-70E740481C1C}">
+                <a14:useLocalDpi xmlns:a14="http://schemas.microsoft.com/office/drawing/2010/main" val="0"/>
+              </a:ext>
+            </a:extLst>
+          </a:blip>
+          <a:stretch>
+            <a:fillRect/>
+          </a:stretch>
+        </p:blipFill>
+        <p:spPr>
+          <a:xfrm>
+            <a:off x="2832497" y="1825625"/>
+            <a:ext cx="6527006" cy="4351338"/>
+          </a:xfrm>
+        </p:spPr>
+      </p:pic>
     </p:spTree>
     <p:extLst>
       <p:ext uri="{BB962C8B-B14F-4D97-AF65-F5344CB8AC3E}">
@@ -7317,44 +7365,9 @@
           </a:p>
         </p:txBody>
       </p:sp>
-      <p:pic>
-        <p:nvPicPr>
-          <p:cNvPr id="5" name="Content Placeholder 4" descr="A picture containing timeline&#10;&#10;Description automatically generated">
-            <a:extLst>
-              <a:ext uri="{FF2B5EF4-FFF2-40B4-BE49-F238E27FC236}">
-                <a16:creationId xmlns:a16="http://schemas.microsoft.com/office/drawing/2014/main" id="{CD1AF8F8-24AF-4D00-AFBF-075ED703D208}"/>
-              </a:ext>
-            </a:extLst>
-          </p:cNvPr>
-          <p:cNvPicPr>
-            <a:picLocks noGrp="1" noChangeAspect="1"/>
-          </p:cNvPicPr>
-          <p:nvPr>
-            <p:ph idx="1"/>
-          </p:nvPr>
-        </p:nvPicPr>
-        <p:blipFill>
-          <a:blip r:embed="rId2">
-            <a:extLst>
-              <a:ext uri="{28A0092B-C50C-407E-A947-70E740481C1C}">
-                <a14:useLocalDpi xmlns:a14="http://schemas.microsoft.com/office/drawing/2010/main" val="0"/>
-              </a:ext>
-            </a:extLst>
-          </a:blip>
-          <a:stretch>
-            <a:fillRect/>
-          </a:stretch>
-        </p:blipFill>
-        <p:spPr>
-          <a:xfrm>
-            <a:off x="3195108" y="1825625"/>
-            <a:ext cx="5801783" cy="4351338"/>
-          </a:xfrm>
-        </p:spPr>
-      </p:pic>
       <mc:AlternateContent xmlns:mc="http://schemas.openxmlformats.org/markup-compatibility/2006">
         <mc:Choice xmlns:p14="http://schemas.microsoft.com/office/powerpoint/2010/main" Requires="p14">
-          <p:contentPart p14:bwMode="auto" r:id="rId3">
+          <p:contentPart p14:bwMode="auto" r:id="rId2">
             <p14:nvContentPartPr>
               <p14:cNvPr id="6" name="Ink 5">
                 <a:extLst>
@@ -7386,7 +7399,7 @@
               <p:nvPr/>
             </p:nvPicPr>
             <p:blipFill>
-              <a:blip r:embed="rId4"/>
+              <a:blip r:embed="rId3"/>
               <a:stretch>
                 <a:fillRect/>
               </a:stretch>
@@ -7405,7 +7418,7 @@
       </mc:AlternateContent>
       <mc:AlternateContent xmlns:mc="http://schemas.openxmlformats.org/markup-compatibility/2006">
         <mc:Choice xmlns:p14="http://schemas.microsoft.com/office/powerpoint/2010/main" Requires="p14">
-          <p:contentPart p14:bwMode="auto" r:id="rId5">
+          <p:contentPart p14:bwMode="auto" r:id="rId4">
             <p14:nvContentPartPr>
               <p14:cNvPr id="7" name="Ink 6">
                 <a:extLst>
@@ -7437,7 +7450,7 @@
               <p:nvPr/>
             </p:nvPicPr>
             <p:blipFill>
-              <a:blip r:embed="rId6"/>
+              <a:blip r:embed="rId5"/>
               <a:stretch>
                 <a:fillRect/>
               </a:stretch>
@@ -7456,7 +7469,7 @@
       </mc:AlternateContent>
       <mc:AlternateContent xmlns:mc="http://schemas.openxmlformats.org/markup-compatibility/2006">
         <mc:Choice xmlns:p14="http://schemas.microsoft.com/office/powerpoint/2010/main" Requires="p14">
-          <p:contentPart p14:bwMode="auto" r:id="rId7">
+          <p:contentPart p14:bwMode="auto" r:id="rId6">
             <p14:nvContentPartPr>
               <p14:cNvPr id="10" name="Ink 9">
                 <a:extLst>
@@ -7488,7 +7501,7 @@
               <p:nvPr/>
             </p:nvPicPr>
             <p:blipFill>
-              <a:blip r:embed="rId8"/>
+              <a:blip r:embed="rId7"/>
               <a:stretch>
                 <a:fillRect/>
               </a:stretch>
@@ -7507,7 +7520,7 @@
       </mc:AlternateContent>
       <mc:AlternateContent xmlns:mc="http://schemas.openxmlformats.org/markup-compatibility/2006">
         <mc:Choice xmlns:p14="http://schemas.microsoft.com/office/powerpoint/2010/main" Requires="p14">
-          <p:contentPart p14:bwMode="auto" r:id="rId9">
+          <p:contentPart p14:bwMode="auto" r:id="rId8">
             <p14:nvContentPartPr>
               <p14:cNvPr id="11" name="Ink 10">
                 <a:extLst>
@@ -7539,7 +7552,7 @@
               <p:nvPr/>
             </p:nvPicPr>
             <p:blipFill>
-              <a:blip r:embed="rId10"/>
+              <a:blip r:embed="rId9"/>
               <a:stretch>
                 <a:fillRect/>
               </a:stretch>
@@ -7556,6 +7569,41 @@
           </p:pic>
         </mc:Fallback>
       </mc:AlternateContent>
+      <p:pic>
+        <p:nvPicPr>
+          <p:cNvPr id="9" name="Content Placeholder 8" descr="A picture containing timeline&#10;&#10;Description automatically generated">
+            <a:extLst>
+              <a:ext uri="{FF2B5EF4-FFF2-40B4-BE49-F238E27FC236}">
+                <a16:creationId xmlns:a16="http://schemas.microsoft.com/office/drawing/2014/main" id="{60F61673-CBBD-40F6-87B2-8E538F958299}"/>
+              </a:ext>
+            </a:extLst>
+          </p:cNvPr>
+          <p:cNvPicPr>
+            <a:picLocks noGrp="1" noChangeAspect="1"/>
+          </p:cNvPicPr>
+          <p:nvPr>
+            <p:ph idx="1"/>
+          </p:nvPr>
+        </p:nvPicPr>
+        <p:blipFill>
+          <a:blip r:embed="rId10">
+            <a:extLst>
+              <a:ext uri="{28A0092B-C50C-407E-A947-70E740481C1C}">
+                <a14:useLocalDpi xmlns:a14="http://schemas.microsoft.com/office/drawing/2010/main" val="0"/>
+              </a:ext>
+            </a:extLst>
+          </a:blip>
+          <a:stretch>
+            <a:fillRect/>
+          </a:stretch>
+        </p:blipFill>
+        <p:spPr>
+          <a:xfrm>
+            <a:off x="2832497" y="1825625"/>
+            <a:ext cx="6527006" cy="4351338"/>
+          </a:xfrm>
+        </p:spPr>
+      </p:pic>
     </p:spTree>
     <p:extLst>
       <p:ext uri="{BB962C8B-B14F-4D97-AF65-F5344CB8AC3E}">
@@ -7835,44 +7883,9 @@
           </a:p>
         </p:txBody>
       </p:sp>
-      <p:pic>
-        <p:nvPicPr>
-          <p:cNvPr id="9" name="Content Placeholder 8" descr="A picture containing timeline&#10;&#10;Description automatically generated">
-            <a:extLst>
-              <a:ext uri="{FF2B5EF4-FFF2-40B4-BE49-F238E27FC236}">
-                <a16:creationId xmlns:a16="http://schemas.microsoft.com/office/drawing/2014/main" id="{240C6908-2E00-42DD-BA03-2074BE42AEAA}"/>
-              </a:ext>
-            </a:extLst>
-          </p:cNvPr>
-          <p:cNvPicPr>
-            <a:picLocks noGrp="1" noChangeAspect="1"/>
-          </p:cNvPicPr>
-          <p:nvPr>
-            <p:ph idx="1"/>
-          </p:nvPr>
-        </p:nvPicPr>
-        <p:blipFill>
-          <a:blip r:embed="rId3">
-            <a:extLst>
-              <a:ext uri="{28A0092B-C50C-407E-A947-70E740481C1C}">
-                <a14:useLocalDpi xmlns:a14="http://schemas.microsoft.com/office/drawing/2010/main" val="0"/>
-              </a:ext>
-            </a:extLst>
-          </a:blip>
-          <a:stretch>
-            <a:fillRect/>
-          </a:stretch>
-        </p:blipFill>
-        <p:spPr>
-          <a:xfrm>
-            <a:off x="2832497" y="1825625"/>
-            <a:ext cx="6527006" cy="4351338"/>
-          </a:xfrm>
-        </p:spPr>
-      </p:pic>
       <mc:AlternateContent xmlns:mc="http://schemas.openxmlformats.org/markup-compatibility/2006">
         <mc:Choice xmlns:p14="http://schemas.microsoft.com/office/powerpoint/2010/main" Requires="p14">
-          <p:contentPart p14:bwMode="auto" r:id="rId4">
+          <p:contentPart p14:bwMode="auto" r:id="rId3">
             <p14:nvContentPartPr>
               <p14:cNvPr id="28" name="Ink 27">
                 <a:extLst>
@@ -7904,7 +7917,7 @@
               <p:nvPr/>
             </p:nvPicPr>
             <p:blipFill>
-              <a:blip r:embed="rId5"/>
+              <a:blip r:embed="rId4"/>
               <a:stretch>
                 <a:fillRect/>
               </a:stretch>
@@ -7943,7 +7956,7 @@
         </p:grpSpPr>
         <mc:AlternateContent xmlns:mc="http://schemas.openxmlformats.org/markup-compatibility/2006">
           <mc:Choice xmlns:p14="http://schemas.microsoft.com/office/powerpoint/2010/main" Requires="p14">
-            <p:contentPart p14:bwMode="auto" r:id="rId6">
+            <p:contentPart p14:bwMode="auto" r:id="rId5">
               <p14:nvContentPartPr>
                 <p14:cNvPr id="29" name="Ink 28">
                   <a:extLst>
@@ -7975,7 +7988,7 @@
                 <p:nvPr/>
               </p:nvPicPr>
               <p:blipFill>
-                <a:blip r:embed="rId7"/>
+                <a:blip r:embed="rId6"/>
                 <a:stretch>
                   <a:fillRect/>
                 </a:stretch>
@@ -7994,7 +8007,7 @@
         </mc:AlternateContent>
         <mc:AlternateContent xmlns:mc="http://schemas.openxmlformats.org/markup-compatibility/2006">
           <mc:Choice xmlns:p14="http://schemas.microsoft.com/office/powerpoint/2010/main" Requires="p14">
-            <p:contentPart p14:bwMode="auto" r:id="rId8">
+            <p:contentPart p14:bwMode="auto" r:id="rId7">
               <p14:nvContentPartPr>
                 <p14:cNvPr id="30" name="Ink 29">
                   <a:extLst>
@@ -8026,7 +8039,7 @@
                 <p:nvPr/>
               </p:nvPicPr>
               <p:blipFill>
-                <a:blip r:embed="rId9"/>
+                <a:blip r:embed="rId8"/>
                 <a:stretch>
                   <a:fillRect/>
                 </a:stretch>
@@ -8045,7 +8058,7 @@
         </mc:AlternateContent>
         <mc:AlternateContent xmlns:mc="http://schemas.openxmlformats.org/markup-compatibility/2006">
           <mc:Choice xmlns:p14="http://schemas.microsoft.com/office/powerpoint/2010/main" Requires="p14">
-            <p:contentPart p14:bwMode="auto" r:id="rId10">
+            <p:contentPart p14:bwMode="auto" r:id="rId9">
               <p14:nvContentPartPr>
                 <p14:cNvPr id="35" name="Ink 34">
                   <a:extLst>
@@ -8077,7 +8090,7 @@
                 <p:nvPr/>
               </p:nvPicPr>
               <p:blipFill>
-                <a:blip r:embed="rId11"/>
+                <a:blip r:embed="rId10"/>
                 <a:stretch>
                   <a:fillRect/>
                 </a:stretch>
@@ -8117,7 +8130,7 @@
         </p:grpSpPr>
         <mc:AlternateContent xmlns:mc="http://schemas.openxmlformats.org/markup-compatibility/2006">
           <mc:Choice xmlns:p14="http://schemas.microsoft.com/office/powerpoint/2010/main" Requires="p14">
-            <p:contentPart p14:bwMode="auto" r:id="rId12">
+            <p:contentPart p14:bwMode="auto" r:id="rId11">
               <p14:nvContentPartPr>
                 <p14:cNvPr id="32" name="Ink 31">
                   <a:extLst>
@@ -8149,7 +8162,7 @@
                 <p:nvPr/>
               </p:nvPicPr>
               <p:blipFill>
-                <a:blip r:embed="rId13"/>
+                <a:blip r:embed="rId12"/>
                 <a:stretch>
                   <a:fillRect/>
                 </a:stretch>
@@ -8168,7 +8181,7 @@
         </mc:AlternateContent>
         <mc:AlternateContent xmlns:mc="http://schemas.openxmlformats.org/markup-compatibility/2006">
           <mc:Choice xmlns:p14="http://schemas.microsoft.com/office/powerpoint/2010/main" Requires="p14">
-            <p:contentPart p14:bwMode="auto" r:id="rId14">
+            <p:contentPart p14:bwMode="auto" r:id="rId13">
               <p14:nvContentPartPr>
                 <p14:cNvPr id="33" name="Ink 32">
                   <a:extLst>
@@ -8200,7 +8213,7 @@
                 <p:nvPr/>
               </p:nvPicPr>
               <p:blipFill>
-                <a:blip r:embed="rId15"/>
+                <a:blip r:embed="rId14"/>
                 <a:stretch>
                   <a:fillRect/>
                 </a:stretch>
@@ -8219,7 +8232,7 @@
         </mc:AlternateContent>
         <mc:AlternateContent xmlns:mc="http://schemas.openxmlformats.org/markup-compatibility/2006">
           <mc:Choice xmlns:p14="http://schemas.microsoft.com/office/powerpoint/2010/main" Requires="p14">
-            <p:contentPart p14:bwMode="auto" r:id="rId16">
+            <p:contentPart p14:bwMode="auto" r:id="rId15">
               <p14:nvContentPartPr>
                 <p14:cNvPr id="37" name="Ink 36">
                   <a:extLst>
@@ -8251,7 +8264,7 @@
                 <p:nvPr/>
               </p:nvPicPr>
               <p:blipFill>
-                <a:blip r:embed="rId17"/>
+                <a:blip r:embed="rId16"/>
                 <a:stretch>
                   <a:fillRect/>
                 </a:stretch>
@@ -8269,6 +8282,41 @@
           </mc:Fallback>
         </mc:AlternateContent>
       </p:grpSp>
+      <p:pic>
+        <p:nvPicPr>
+          <p:cNvPr id="6" name="Content Placeholder 5" descr="Timeline&#10;&#10;Description automatically generated">
+            <a:extLst>
+              <a:ext uri="{FF2B5EF4-FFF2-40B4-BE49-F238E27FC236}">
+                <a16:creationId xmlns:a16="http://schemas.microsoft.com/office/drawing/2014/main" id="{5AC10329-71E1-4B6E-9522-C245E866C60E}"/>
+              </a:ext>
+            </a:extLst>
+          </p:cNvPr>
+          <p:cNvPicPr>
+            <a:picLocks noGrp="1" noChangeAspect="1"/>
+          </p:cNvPicPr>
+          <p:nvPr>
+            <p:ph idx="1"/>
+          </p:nvPr>
+        </p:nvPicPr>
+        <p:blipFill>
+          <a:blip r:embed="rId17">
+            <a:extLst>
+              <a:ext uri="{28A0092B-C50C-407E-A947-70E740481C1C}">
+                <a14:useLocalDpi xmlns:a14="http://schemas.microsoft.com/office/drawing/2010/main" val="0"/>
+              </a:ext>
+            </a:extLst>
+          </a:blip>
+          <a:stretch>
+            <a:fillRect/>
+          </a:stretch>
+        </p:blipFill>
+        <p:spPr>
+          <a:xfrm>
+            <a:off x="2832497" y="1825625"/>
+            <a:ext cx="6527006" cy="4351338"/>
+          </a:xfrm>
+        </p:spPr>
+      </p:pic>
     </p:spTree>
     <p:extLst>
       <p:ext uri="{BB962C8B-B14F-4D97-AF65-F5344CB8AC3E}">

</xml_diff>